<commit_message>
Fix Use Case Diagram
</commit_message>
<xml_diff>
--- a/04 - Idea Evaluation/Idea Evaluation Slides - Approved Draft.pptx
+++ b/04 - Idea Evaluation/Idea Evaluation Slides - Approved Draft.pptx
@@ -223,7 +223,7 @@
           <a:p>
             <a:fld id="{EF96ACE9-C9FC-4287-B6B2-A985566C0C1D}" type="datetimeFigureOut">
               <a:rPr lang="en-US" smtClean="0"/>
-              <a:t>10/17/2024</a:t>
+              <a:t>12/11/2024</a:t>
             </a:fld>
             <a:endParaRPr lang="en-US"/>
           </a:p>
@@ -703,7 +703,7 @@
           <a:p>
             <a:fld id="{586E079D-FA02-4D7C-A067-025B69BED90B}" type="datetime1">
               <a:rPr lang="en-US" smtClean="0"/>
-              <a:t>10/17/2024</a:t>
+              <a:t>12/11/2024</a:t>
             </a:fld>
             <a:endParaRPr lang="en-US"/>
           </a:p>
@@ -871,7 +871,7 @@
           <a:p>
             <a:fld id="{6D7522E9-98FD-4107-9492-08DFF93C6D24}" type="datetime1">
               <a:rPr lang="en-US" smtClean="0"/>
-              <a:t>10/17/2024</a:t>
+              <a:t>12/11/2024</a:t>
             </a:fld>
             <a:endParaRPr lang="en-US"/>
           </a:p>
@@ -1049,7 +1049,7 @@
           <a:p>
             <a:fld id="{64F554E4-DA44-4B32-87BE-D7B31E3ECA58}" type="datetime1">
               <a:rPr lang="en-US" smtClean="0"/>
-              <a:t>10/17/2024</a:t>
+              <a:t>12/11/2024</a:t>
             </a:fld>
             <a:endParaRPr lang="en-US"/>
           </a:p>
@@ -1217,7 +1217,7 @@
           <a:p>
             <a:fld id="{F8F961F9-3228-4C84-B7EB-9F8A722527A0}" type="datetime1">
               <a:rPr lang="en-US" smtClean="0"/>
-              <a:t>10/17/2024</a:t>
+              <a:t>12/11/2024</a:t>
             </a:fld>
             <a:endParaRPr lang="en-US"/>
           </a:p>
@@ -1471,7 +1471,7 @@
           <a:p>
             <a:fld id="{73A0622A-4FB7-4F38-AFAB-76F70168B3E8}" type="datetime1">
               <a:rPr lang="en-US" smtClean="0"/>
-              <a:t>10/17/2024</a:t>
+              <a:t>12/11/2024</a:t>
             </a:fld>
             <a:endParaRPr lang="en-US"/>
           </a:p>
@@ -1700,7 +1700,7 @@
           <a:p>
             <a:fld id="{CC0056DD-091F-4BC0-AA2B-F6BC69D80646}" type="datetime1">
               <a:rPr lang="en-US" smtClean="0"/>
-              <a:t>10/17/2024</a:t>
+              <a:t>12/11/2024</a:t>
             </a:fld>
             <a:endParaRPr lang="en-US"/>
           </a:p>
@@ -2064,7 +2064,7 @@
           <a:p>
             <a:fld id="{83585785-5EDB-4737-A101-54392E9630A0}" type="datetime1">
               <a:rPr lang="en-US" smtClean="0"/>
-              <a:t>10/17/2024</a:t>
+              <a:t>12/11/2024</a:t>
             </a:fld>
             <a:endParaRPr lang="en-US"/>
           </a:p>
@@ -2181,7 +2181,7 @@
           <a:p>
             <a:fld id="{51DC2124-0584-42D9-98DF-2C781C7767AD}" type="datetime1">
               <a:rPr lang="en-US" smtClean="0"/>
-              <a:t>10/17/2024</a:t>
+              <a:t>12/11/2024</a:t>
             </a:fld>
             <a:endParaRPr lang="en-US"/>
           </a:p>
@@ -2276,7 +2276,7 @@
           <a:p>
             <a:fld id="{04579D91-6D40-4365-B913-ABC87F070EFF}" type="datetime1">
               <a:rPr lang="en-US" smtClean="0"/>
-              <a:t>10/17/2024</a:t>
+              <a:t>12/11/2024</a:t>
             </a:fld>
             <a:endParaRPr lang="en-US"/>
           </a:p>
@@ -2551,7 +2551,7 @@
           <a:p>
             <a:fld id="{9B030D12-A29D-4657-A570-DED5763DBAB4}" type="datetime1">
               <a:rPr lang="en-US" smtClean="0"/>
-              <a:t>10/17/2024</a:t>
+              <a:t>12/11/2024</a:t>
             </a:fld>
             <a:endParaRPr lang="en-US"/>
           </a:p>
@@ -2803,7 +2803,7 @@
           <a:p>
             <a:fld id="{3521DB1F-5EC7-49FD-BD5D-D2AECE211981}" type="datetime1">
               <a:rPr lang="en-US" smtClean="0"/>
-              <a:t>10/17/2024</a:t>
+              <a:t>12/11/2024</a:t>
             </a:fld>
             <a:endParaRPr lang="en-US"/>
           </a:p>
@@ -3014,7 +3014,7 @@
           <a:p>
             <a:fld id="{DCC94D58-688E-4B09-A302-FBEE63827EDE}" type="datetime1">
               <a:rPr lang="en-US" smtClean="0"/>
-              <a:t>10/17/2024</a:t>
+              <a:t>12/11/2024</a:t>
             </a:fld>
             <a:endParaRPr lang="en-US"/>
           </a:p>
@@ -6460,10 +6460,10 @@
       </p:sp>
       <p:pic>
         <p:nvPicPr>
-          <p:cNvPr id="7" name="Content Placeholder 6" descr="A diagram of a computer network&#10;&#10;Description automatically generated with medium confidence">
+          <p:cNvPr id="9" name="Content Placeholder 8" descr="A diagram of a diagram">
             <a:extLst>
               <a:ext uri="{FF2B5EF4-FFF2-40B4-BE49-F238E27FC236}">
-                <a16:creationId xmlns:a16="http://schemas.microsoft.com/office/drawing/2014/main" id="{E157D00D-6B2C-6CBB-D958-B83F900F40E5}"/>
+                <a16:creationId xmlns:a16="http://schemas.microsoft.com/office/drawing/2014/main" id="{58989D7B-F08B-8B06-ABAE-9F2C40D39414}"/>
               </a:ext>
             </a:extLst>
           </p:cNvPr>
@@ -6475,7 +6475,7 @@
           </p:nvPr>
         </p:nvPicPr>
         <p:blipFill>
-          <a:blip r:embed="rId2">
+          <a:blip r:embed="rId2" cstate="print">
             <a:extLst>
               <a:ext uri="{28A0092B-C50C-407E-A947-70E740481C1C}">
                 <a14:useLocalDpi xmlns:a14="http://schemas.microsoft.com/office/drawing/2010/main" val="0"/>
@@ -6488,8 +6488,8 @@
         </p:blipFill>
         <p:spPr>
           <a:xfrm>
-            <a:off x="2815829" y="1825624"/>
-            <a:ext cx="6560341" cy="5032376"/>
+            <a:off x="1928605" y="1825625"/>
+            <a:ext cx="8334790" cy="4351338"/>
           </a:xfrm>
         </p:spPr>
       </p:pic>

</xml_diff>